<commit_message>
updated docs and gui for low level words
</commit_message>
<xml_diff>
--- a/Presentation final.pptx
+++ b/Presentation final.pptx
@@ -5,7 +5,7 @@
     <p:sldMasterId id="2147483876" r:id="rId1"/>
   </p:sldMasterIdLst>
   <p:notesMasterIdLst>
-    <p:notesMasterId r:id="rId20"/>
+    <p:notesMasterId r:id="rId11"/>
   </p:notesMasterIdLst>
   <p:sldIdLst>
     <p:sldId id="256" r:id="rId2"/>
@@ -14,18 +14,9 @@
     <p:sldId id="263" r:id="rId5"/>
     <p:sldId id="261" r:id="rId6"/>
     <p:sldId id="262" r:id="rId7"/>
-    <p:sldId id="274" r:id="rId8"/>
-    <p:sldId id="275" r:id="rId9"/>
-    <p:sldId id="276" r:id="rId10"/>
-    <p:sldId id="265" r:id="rId11"/>
-    <p:sldId id="269" r:id="rId12"/>
-    <p:sldId id="266" r:id="rId13"/>
-    <p:sldId id="270" r:id="rId14"/>
-    <p:sldId id="267" r:id="rId15"/>
-    <p:sldId id="271" r:id="rId16"/>
-    <p:sldId id="272" r:id="rId17"/>
-    <p:sldId id="268" r:id="rId18"/>
-    <p:sldId id="273" r:id="rId19"/>
+    <p:sldId id="275" r:id="rId8"/>
+    <p:sldId id="274" r:id="rId9"/>
+    <p:sldId id="273" r:id="rId10"/>
   </p:sldIdLst>
   <p:sldSz cx="9144000" cy="6858000" type="screen4x3"/>
   <p:notesSz cx="6858000" cy="9144000"/>
@@ -126,7 +117,7 @@
   </p:defaultTextStyle>
   <p:extLst>
     <p:ext uri="{EFAFB233-063F-42B5-8137-9DF3F51BA10A}">
-      <p15:sldGuideLst xmlns="" xmlns:p15="http://schemas.microsoft.com/office/powerpoint/2012/main">
+      <p15:sldGuideLst xmlns:p15="http://schemas.microsoft.com/office/powerpoint/2012/main" xmlns="">
         <p15:guide id="1" orient="horz" pos="2160">
           <p15:clr>
             <a:srgbClr val="A4A3A4"/>
@@ -226,7 +217,7 @@
             <a:fld id="{FFE8CAE7-52B7-4DBB-8CD5-E83B49AD58B9}" type="datetimeFigureOut">
               <a:rPr lang="en-US" smtClean="0"/>
               <a:pPr/>
-              <a:t>5/11/2020</a:t>
+              <a:t>5/12/2020</a:t>
             </a:fld>
             <a:endParaRPr lang="en-US"/>
           </a:p>
@@ -492,199 +483,6 @@
 </p:notesMaster>
 </file>
 
-<file path=ppt/notesSlides/notesSlide1.xml><?xml version="1.0" encoding="utf-8"?>
-<p:notes xmlns:a="http://schemas.openxmlformats.org/drawingml/2006/main" xmlns:r="http://schemas.openxmlformats.org/officeDocument/2006/relationships" xmlns:p="http://schemas.openxmlformats.org/presentationml/2006/main">
-  <p:cSld>
-    <p:spTree>
-      <p:nvGrpSpPr>
-        <p:cNvPr id="1" name=""/>
-        <p:cNvGrpSpPr/>
-        <p:nvPr/>
-      </p:nvGrpSpPr>
-      <p:grpSpPr>
-        <a:xfrm>
-          <a:off x="0" y="0"/>
-          <a:ext cx="0" cy="0"/>
-          <a:chOff x="0" y="0"/>
-          <a:chExt cx="0" cy="0"/>
-        </a:xfrm>
-      </p:grpSpPr>
-      <p:sp>
-        <p:nvSpPr>
-          <p:cNvPr id="2" name="Slide Image Placeholder 1"/>
-          <p:cNvSpPr>
-            <a:spLocks noGrp="1" noRot="1" noChangeAspect="1"/>
-          </p:cNvSpPr>
-          <p:nvPr>
-            <p:ph type="sldImg"/>
-          </p:nvPr>
-        </p:nvSpPr>
-        <p:spPr/>
-      </p:sp>
-      <p:sp>
-        <p:nvSpPr>
-          <p:cNvPr id="3" name="Notes Placeholder 2"/>
-          <p:cNvSpPr>
-            <a:spLocks noGrp="1"/>
-          </p:cNvSpPr>
-          <p:nvPr>
-            <p:ph type="body" idx="1"/>
-          </p:nvPr>
-        </p:nvSpPr>
-        <p:spPr/>
-        <p:txBody>
-          <a:bodyPr>
-            <a:normAutofit/>
-          </a:bodyPr>
-          <a:lstStyle/>
-          <a:p>
-            <a:endParaRPr lang="en-US" dirty="0"/>
-          </a:p>
-        </p:txBody>
-      </p:sp>
-      <p:sp>
-        <p:nvSpPr>
-          <p:cNvPr id="4" name="Slide Number Placeholder 3"/>
-          <p:cNvSpPr>
-            <a:spLocks noGrp="1"/>
-          </p:cNvSpPr>
-          <p:nvPr>
-            <p:ph type="sldNum" sz="quarter" idx="10"/>
-          </p:nvPr>
-        </p:nvSpPr>
-        <p:spPr/>
-        <p:txBody>
-          <a:bodyPr/>
-          <a:lstStyle/>
-          <a:p>
-            <a:fld id="{58D1D381-F4D4-482B-AAB5-1847614CA090}" type="slidenum">
-              <a:rPr lang="en-US" smtClean="0"/>
-              <a:pPr/>
-              <a:t>8</a:t>
-            </a:fld>
-            <a:endParaRPr lang="en-US"/>
-          </a:p>
-        </p:txBody>
-      </p:sp>
-    </p:spTree>
-  </p:cSld>
-  <p:clrMapOvr>
-    <a:masterClrMapping/>
-  </p:clrMapOvr>
-</p:notes>
-</file>
-
-<file path=ppt/notesSlides/notesSlide2.xml><?xml version="1.0" encoding="utf-8"?>
-<p:notes xmlns:a="http://schemas.openxmlformats.org/drawingml/2006/main" xmlns:r="http://schemas.openxmlformats.org/officeDocument/2006/relationships" xmlns:p="http://schemas.openxmlformats.org/presentationml/2006/main">
-  <p:cSld>
-    <p:spTree>
-      <p:nvGrpSpPr>
-        <p:cNvPr id="1" name=""/>
-        <p:cNvGrpSpPr/>
-        <p:nvPr/>
-      </p:nvGrpSpPr>
-      <p:grpSpPr>
-        <a:xfrm>
-          <a:off x="0" y="0"/>
-          <a:ext cx="0" cy="0"/>
-          <a:chOff x="0" y="0"/>
-          <a:chExt cx="0" cy="0"/>
-        </a:xfrm>
-      </p:grpSpPr>
-      <p:sp>
-        <p:nvSpPr>
-          <p:cNvPr id="2" name="Slide Image Placeholder 1"/>
-          <p:cNvSpPr>
-            <a:spLocks noGrp="1" noRot="1" noChangeAspect="1"/>
-          </p:cNvSpPr>
-          <p:nvPr>
-            <p:ph type="sldImg"/>
-          </p:nvPr>
-        </p:nvSpPr>
-        <p:spPr/>
-      </p:sp>
-      <p:sp>
-        <p:nvSpPr>
-          <p:cNvPr id="3" name="Notes Placeholder 2"/>
-          <p:cNvSpPr>
-            <a:spLocks noGrp="1"/>
-          </p:cNvSpPr>
-          <p:nvPr>
-            <p:ph type="body" idx="1"/>
-          </p:nvPr>
-        </p:nvSpPr>
-        <p:spPr/>
-        <p:txBody>
-          <a:bodyPr>
-            <a:normAutofit/>
-          </a:bodyPr>
-          <a:lstStyle/>
-          <a:p>
-            <a:pPr marL="0" marR="0" indent="0" algn="l" defTabSz="914400" rtl="0" eaLnBrk="1" fontAlgn="auto" latinLnBrk="0" hangingPunct="1">
-              <a:lnSpc>
-                <a:spcPct val="100000"/>
-              </a:lnSpc>
-              <a:spcBef>
-                <a:spcPts val="0"/>
-              </a:spcBef>
-              <a:spcAft>
-                <a:spcPts val="0"/>
-              </a:spcAft>
-              <a:buClrTx/>
-              <a:buSzTx/>
-              <a:buFontTx/>
-              <a:buNone/>
-              <a:tabLst/>
-              <a:defRPr/>
-            </a:pPr>
-            <a:r>
-              <a:rPr lang="en-US" dirty="0" smtClean="0">
-                <a:hlinkClick r:id="rId3"/>
-              </a:rPr>
-              <a:t>https://www.boatloadpuzzles.com/playcrossword</a:t>
-            </a:r>
-            <a:r>
-              <a:rPr lang="en-US" dirty="0" smtClean="0"/>
-              <a:t> for solving crossword</a:t>
-            </a:r>
-          </a:p>
-          <a:p>
-            <a:endParaRPr lang="en-US" dirty="0"/>
-          </a:p>
-        </p:txBody>
-      </p:sp>
-      <p:sp>
-        <p:nvSpPr>
-          <p:cNvPr id="4" name="Slide Number Placeholder 3"/>
-          <p:cNvSpPr>
-            <a:spLocks noGrp="1"/>
-          </p:cNvSpPr>
-          <p:nvPr>
-            <p:ph type="sldNum" sz="quarter" idx="10"/>
-          </p:nvPr>
-        </p:nvSpPr>
-        <p:spPr/>
-        <p:txBody>
-          <a:bodyPr/>
-          <a:lstStyle/>
-          <a:p>
-            <a:fld id="{58D1D381-F4D4-482B-AAB5-1847614CA090}" type="slidenum">
-              <a:rPr lang="en-US" smtClean="0"/>
-              <a:pPr/>
-              <a:t>11</a:t>
-            </a:fld>
-            <a:endParaRPr lang="en-US"/>
-          </a:p>
-        </p:txBody>
-      </p:sp>
-    </p:spTree>
-  </p:cSld>
-  <p:clrMapOvr>
-    <a:masterClrMapping/>
-  </p:clrMapOvr>
-</p:notes>
-</file>
-
 <file path=ppt/slideLayouts/slideLayout1.xml><?xml version="1.0" encoding="utf-8"?>
 <p:sldLayout xmlns:a="http://schemas.openxmlformats.org/drawingml/2006/main" xmlns:r="http://schemas.openxmlformats.org/officeDocument/2006/relationships" xmlns:p="http://schemas.openxmlformats.org/presentationml/2006/main" showMasterSp="0" type="title" preserve="1">
   <p:cSld name="Title Slide">
@@ -1021,7 +819,7 @@
             <a:fld id="{1D8BD707-D9CF-40AE-B4C6-C98DA3205C09}" type="datetimeFigureOut">
               <a:rPr lang="en-US" smtClean="0"/>
               <a:pPr/>
-              <a:t>5/11/2020</a:t>
+              <a:t>5/12/2020</a:t>
             </a:fld>
             <a:endParaRPr lang="en-US"/>
           </a:p>
@@ -2106,7 +1904,7 @@
             <a:fld id="{1D8BD707-D9CF-40AE-B4C6-C98DA3205C09}" type="datetimeFigureOut">
               <a:rPr lang="en-US" smtClean="0"/>
               <a:pPr/>
-              <a:t>5/11/2020</a:t>
+              <a:t>5/12/2020</a:t>
             </a:fld>
             <a:endParaRPr lang="en-US"/>
           </a:p>
@@ -3083,7 +2881,7 @@
             <a:fld id="{1D8BD707-D9CF-40AE-B4C6-C98DA3205C09}" type="datetimeFigureOut">
               <a:rPr lang="en-US" smtClean="0"/>
               <a:pPr/>
-              <a:t>5/11/2020</a:t>
+              <a:t>5/12/2020</a:t>
             </a:fld>
             <a:endParaRPr lang="en-US"/>
           </a:p>
@@ -4214,7 +4012,7 @@
             <a:fld id="{1D8BD707-D9CF-40AE-B4C6-C98DA3205C09}" type="datetimeFigureOut">
               <a:rPr lang="en-US" smtClean="0"/>
               <a:pPr/>
-              <a:t>5/11/2020</a:t>
+              <a:t>5/12/2020</a:t>
             </a:fld>
             <a:endParaRPr lang="en-US"/>
           </a:p>
@@ -5244,7 +5042,7 @@
             <a:fld id="{1D8BD707-D9CF-40AE-B4C6-C98DA3205C09}" type="datetimeFigureOut">
               <a:rPr lang="en-US" smtClean="0"/>
               <a:pPr/>
-              <a:t>5/11/2020</a:t>
+              <a:t>5/12/2020</a:t>
             </a:fld>
             <a:endParaRPr lang="en-US"/>
           </a:p>
@@ -5901,7 +5699,7 @@
             <a:fld id="{1D8BD707-D9CF-40AE-B4C6-C98DA3205C09}" type="datetimeFigureOut">
               <a:rPr lang="en-US" smtClean="0"/>
               <a:pPr/>
-              <a:t>5/11/2020</a:t>
+              <a:t>5/12/2020</a:t>
             </a:fld>
             <a:endParaRPr lang="en-US"/>
           </a:p>
@@ -6759,7 +6557,7 @@
             <a:fld id="{1D8BD707-D9CF-40AE-B4C6-C98DA3205C09}" type="datetimeFigureOut">
               <a:rPr lang="en-US" smtClean="0"/>
               <a:pPr/>
-              <a:t>5/11/2020</a:t>
+              <a:t>5/12/2020</a:t>
             </a:fld>
             <a:endParaRPr lang="en-US"/>
           </a:p>
@@ -6946,7 +6744,7 @@
             <a:fld id="{1D8BD707-D9CF-40AE-B4C6-C98DA3205C09}" type="datetimeFigureOut">
               <a:rPr lang="en-US" smtClean="0"/>
               <a:pPr/>
-              <a:t>5/11/2020</a:t>
+              <a:t>5/12/2020</a:t>
             </a:fld>
             <a:endParaRPr lang="en-US"/>
           </a:p>
@@ -7915,7 +7713,7 @@
             <a:fld id="{1D8BD707-D9CF-40AE-B4C6-C98DA3205C09}" type="datetimeFigureOut">
               <a:rPr lang="en-US" smtClean="0"/>
               <a:pPr/>
-              <a:t>5/11/2020</a:t>
+              <a:t>5/12/2020</a:t>
             </a:fld>
             <a:endParaRPr lang="en-US"/>
           </a:p>
@@ -8123,7 +7921,7 @@
             <a:fld id="{1D8BD707-D9CF-40AE-B4C6-C98DA3205C09}" type="datetimeFigureOut">
               <a:rPr lang="en-US" smtClean="0"/>
               <a:pPr/>
-              <a:t>5/11/2020</a:t>
+              <a:t>5/12/2020</a:t>
             </a:fld>
             <a:endParaRPr lang="en-US"/>
           </a:p>
@@ -9154,7 +8952,7 @@
             <a:fld id="{1D8BD707-D9CF-40AE-B4C6-C98DA3205C09}" type="datetimeFigureOut">
               <a:rPr lang="en-US" smtClean="0"/>
               <a:pPr/>
-              <a:t>5/11/2020</a:t>
+              <a:t>5/12/2020</a:t>
             </a:fld>
             <a:endParaRPr lang="en-US"/>
           </a:p>
@@ -9423,7 +9221,7 @@
             <a:fld id="{1D8BD707-D9CF-40AE-B4C6-C98DA3205C09}" type="datetimeFigureOut">
               <a:rPr lang="en-US" smtClean="0"/>
               <a:pPr/>
-              <a:t>5/11/2020</a:t>
+              <a:t>5/12/2020</a:t>
             </a:fld>
             <a:endParaRPr lang="en-US"/>
           </a:p>
@@ -9830,7 +9628,7 @@
             <a:fld id="{1D8BD707-D9CF-40AE-B4C6-C98DA3205C09}" type="datetimeFigureOut">
               <a:rPr lang="en-US" smtClean="0"/>
               <a:pPr/>
-              <a:t>5/11/2020</a:t>
+              <a:t>5/12/2020</a:t>
             </a:fld>
             <a:endParaRPr lang="en-US"/>
           </a:p>
@@ -9954,7 +9752,7 @@
             <a:fld id="{1D8BD707-D9CF-40AE-B4C6-C98DA3205C09}" type="datetimeFigureOut">
               <a:rPr lang="en-US" smtClean="0"/>
               <a:pPr/>
-              <a:t>5/11/2020</a:t>
+              <a:t>5/12/2020</a:t>
             </a:fld>
             <a:endParaRPr lang="en-US"/>
           </a:p>
@@ -10046,7 +9844,7 @@
             <a:fld id="{1D8BD707-D9CF-40AE-B4C6-C98DA3205C09}" type="datetimeFigureOut">
               <a:rPr lang="en-US" smtClean="0"/>
               <a:pPr/>
-              <a:t>5/11/2020</a:t>
+              <a:t>5/12/2020</a:t>
             </a:fld>
             <a:endParaRPr lang="en-US"/>
           </a:p>
@@ -11124,7 +10922,7 @@
             <a:fld id="{1D8BD707-D9CF-40AE-B4C6-C98DA3205C09}" type="datetimeFigureOut">
               <a:rPr lang="en-US" smtClean="0"/>
               <a:pPr/>
-              <a:t>5/11/2020</a:t>
+              <a:t>5/12/2020</a:t>
             </a:fld>
             <a:endParaRPr lang="en-US"/>
           </a:p>
@@ -12229,7 +12027,7 @@
             <a:fld id="{1D8BD707-D9CF-40AE-B4C6-C98DA3205C09}" type="datetimeFigureOut">
               <a:rPr lang="en-US" smtClean="0"/>
               <a:pPr/>
-              <a:t>5/11/2020</a:t>
+              <a:t>5/12/2020</a:t>
             </a:fld>
             <a:endParaRPr lang="en-US"/>
           </a:p>
@@ -13223,7 +13021,7 @@
             <a:fld id="{1D8BD707-D9CF-40AE-B4C6-C98DA3205C09}" type="datetimeFigureOut">
               <a:rPr lang="en-US" smtClean="0"/>
               <a:pPr/>
-              <a:t>5/11/2020</a:t>
+              <a:t>5/12/2020</a:t>
             </a:fld>
             <a:endParaRPr lang="en-US"/>
           </a:p>
@@ -13932,778 +13730,6 @@
 </p:sld>
 </file>
 
-<file path=ppt/slides/slide10.xml><?xml version="1.0" encoding="utf-8"?>
-<p:sld xmlns:a="http://schemas.openxmlformats.org/drawingml/2006/main" xmlns:r="http://schemas.openxmlformats.org/officeDocument/2006/relationships" xmlns:p="http://schemas.openxmlformats.org/presentationml/2006/main">
-  <p:cSld>
-    <p:spTree>
-      <p:nvGrpSpPr>
-        <p:cNvPr id="1" name=""/>
-        <p:cNvGrpSpPr/>
-        <p:nvPr/>
-      </p:nvGrpSpPr>
-      <p:grpSpPr>
-        <a:xfrm>
-          <a:off x="0" y="0"/>
-          <a:ext cx="0" cy="0"/>
-          <a:chOff x="0" y="0"/>
-          <a:chExt cx="0" cy="0"/>
-        </a:xfrm>
-      </p:grpSpPr>
-      <p:sp>
-        <p:nvSpPr>
-          <p:cNvPr id="2" name="Title 1"/>
-          <p:cNvSpPr>
-            <a:spLocks noGrp="1"/>
-          </p:cNvSpPr>
-          <p:nvPr>
-            <p:ph type="title"/>
-          </p:nvPr>
-        </p:nvSpPr>
-        <p:spPr/>
-        <p:txBody>
-          <a:bodyPr/>
-          <a:lstStyle/>
-          <a:p>
-            <a:r>
-              <a:rPr lang="en-US" dirty="0" smtClean="0"/>
-              <a:t>Crossword Helper</a:t>
-            </a:r>
-            <a:endParaRPr lang="en-US" dirty="0"/>
-          </a:p>
-        </p:txBody>
-      </p:sp>
-      <p:sp>
-        <p:nvSpPr>
-          <p:cNvPr id="3" name="Content Placeholder 2"/>
-          <p:cNvSpPr>
-            <a:spLocks noGrp="1"/>
-          </p:cNvSpPr>
-          <p:nvPr>
-            <p:ph idx="1"/>
-          </p:nvPr>
-        </p:nvSpPr>
-        <p:spPr/>
-        <p:txBody>
-          <a:bodyPr/>
-          <a:lstStyle/>
-          <a:p>
-            <a:r>
-              <a:rPr lang="en-US" dirty="0" smtClean="0"/>
-              <a:t>User can enter a word nearest to their description</a:t>
-            </a:r>
-          </a:p>
-          <a:p>
-            <a:r>
-              <a:rPr lang="en-US" dirty="0" smtClean="0"/>
-              <a:t>And the length of the word</a:t>
-            </a:r>
-          </a:p>
-          <a:p>
-            <a:endParaRPr lang="en-US" dirty="0" smtClean="0"/>
-          </a:p>
-          <a:p>
-            <a:r>
-              <a:rPr lang="en-US" dirty="0" smtClean="0"/>
-              <a:t>The user receives a list of words, which they can narrow down by defining a particular character and its position.</a:t>
-            </a:r>
-            <a:endParaRPr lang="en-US" dirty="0"/>
-          </a:p>
-        </p:txBody>
-      </p:sp>
-    </p:spTree>
-  </p:cSld>
-  <p:clrMapOvr>
-    <a:masterClrMapping/>
-  </p:clrMapOvr>
-  <p:timing>
-    <p:tnLst>
-      <p:par>
-        <p:cTn id="1" dur="indefinite" restart="never" nodeType="tmRoot"/>
-      </p:par>
-    </p:tnLst>
-  </p:timing>
-</p:sld>
-</file>
-
-<file path=ppt/slides/slide11.xml><?xml version="1.0" encoding="utf-8"?>
-<p:sld xmlns:a="http://schemas.openxmlformats.org/drawingml/2006/main" xmlns:r="http://schemas.openxmlformats.org/officeDocument/2006/relationships" xmlns:p="http://schemas.openxmlformats.org/presentationml/2006/main">
-  <p:cSld>
-    <p:spTree>
-      <p:nvGrpSpPr>
-        <p:cNvPr id="1" name=""/>
-        <p:cNvGrpSpPr/>
-        <p:nvPr/>
-      </p:nvGrpSpPr>
-      <p:grpSpPr>
-        <a:xfrm>
-          <a:off x="0" y="0"/>
-          <a:ext cx="0" cy="0"/>
-          <a:chOff x="0" y="0"/>
-          <a:chExt cx="0" cy="0"/>
-        </a:xfrm>
-      </p:grpSpPr>
-      <p:sp>
-        <p:nvSpPr>
-          <p:cNvPr id="2" name="Title 1"/>
-          <p:cNvSpPr>
-            <a:spLocks noGrp="1"/>
-          </p:cNvSpPr>
-          <p:nvPr>
-            <p:ph type="title"/>
-          </p:nvPr>
-        </p:nvSpPr>
-        <p:spPr/>
-        <p:txBody>
-          <a:bodyPr/>
-          <a:lstStyle/>
-          <a:p>
-            <a:r>
-              <a:rPr lang="en-US" dirty="0" smtClean="0"/>
-              <a:t>Crossword Helper</a:t>
-            </a:r>
-            <a:endParaRPr lang="en-US" dirty="0"/>
-          </a:p>
-        </p:txBody>
-      </p:sp>
-      <p:pic>
-        <p:nvPicPr>
-          <p:cNvPr id="1026" name="Picture 2"/>
-          <p:cNvPicPr>
-            <a:picLocks noGrp="1" noChangeAspect="1" noChangeArrowheads="1"/>
-          </p:cNvPicPr>
-          <p:nvPr>
-            <p:ph idx="1"/>
-          </p:nvPr>
-        </p:nvPicPr>
-        <p:blipFill>
-          <a:blip r:embed="rId3"/>
-          <a:srcRect/>
-          <a:stretch>
-            <a:fillRect/>
-          </a:stretch>
-        </p:blipFill>
-        <p:spPr bwMode="auto">
-          <a:xfrm>
-            <a:off x="1752600" y="2286000"/>
-            <a:ext cx="4495800" cy="3543617"/>
-          </a:xfrm>
-          <a:prstGeom prst="rect">
-            <a:avLst/>
-          </a:prstGeom>
-          <a:noFill/>
-          <a:ln w="9525">
-            <a:noFill/>
-            <a:miter lim="800000"/>
-            <a:headEnd/>
-            <a:tailEnd/>
-          </a:ln>
-          <a:effectLst/>
-        </p:spPr>
-      </p:pic>
-    </p:spTree>
-  </p:cSld>
-  <p:clrMapOvr>
-    <a:masterClrMapping/>
-  </p:clrMapOvr>
-  <p:timing>
-    <p:tnLst>
-      <p:par>
-        <p:cTn id="1" dur="indefinite" restart="never" nodeType="tmRoot"/>
-      </p:par>
-    </p:tnLst>
-  </p:timing>
-</p:sld>
-</file>
-
-<file path=ppt/slides/slide12.xml><?xml version="1.0" encoding="utf-8"?>
-<p:sld xmlns:a="http://schemas.openxmlformats.org/drawingml/2006/main" xmlns:r="http://schemas.openxmlformats.org/officeDocument/2006/relationships" xmlns:p="http://schemas.openxmlformats.org/presentationml/2006/main">
-  <p:cSld>
-    <p:spTree>
-      <p:nvGrpSpPr>
-        <p:cNvPr id="1" name=""/>
-        <p:cNvGrpSpPr/>
-        <p:nvPr/>
-      </p:nvGrpSpPr>
-      <p:grpSpPr>
-        <a:xfrm>
-          <a:off x="0" y="0"/>
-          <a:ext cx="0" cy="0"/>
-          <a:chOff x="0" y="0"/>
-          <a:chExt cx="0" cy="0"/>
-        </a:xfrm>
-      </p:grpSpPr>
-      <p:sp>
-        <p:nvSpPr>
-          <p:cNvPr id="2" name="Title 1"/>
-          <p:cNvSpPr>
-            <a:spLocks noGrp="1"/>
-          </p:cNvSpPr>
-          <p:nvPr>
-            <p:ph type="title"/>
-          </p:nvPr>
-        </p:nvSpPr>
-        <p:spPr/>
-        <p:txBody>
-          <a:bodyPr/>
-          <a:lstStyle/>
-          <a:p>
-            <a:r>
-              <a:rPr lang="en-US" dirty="0" smtClean="0"/>
-              <a:t>Scrabble Helper</a:t>
-            </a:r>
-            <a:endParaRPr lang="en-US" dirty="0"/>
-          </a:p>
-        </p:txBody>
-      </p:sp>
-      <p:sp>
-        <p:nvSpPr>
-          <p:cNvPr id="3" name="Content Placeholder 2"/>
-          <p:cNvSpPr>
-            <a:spLocks noGrp="1"/>
-          </p:cNvSpPr>
-          <p:nvPr>
-            <p:ph idx="1"/>
-          </p:nvPr>
-        </p:nvSpPr>
-        <p:spPr>
-          <a:xfrm>
-            <a:off x="990600" y="2971800"/>
-            <a:ext cx="6619244" cy="3416300"/>
-          </a:xfrm>
-        </p:spPr>
-        <p:txBody>
-          <a:bodyPr/>
-          <a:lstStyle/>
-          <a:p>
-            <a:r>
-              <a:rPr lang="en-US" dirty="0" smtClean="0"/>
-              <a:t>User can enter a word fragment they need in their word</a:t>
-            </a:r>
-          </a:p>
-          <a:p>
-            <a:r>
-              <a:rPr lang="en-US" dirty="0" smtClean="0"/>
-              <a:t>They can also enter its position and length.</a:t>
-            </a:r>
-            <a:endParaRPr lang="en-US" dirty="0"/>
-          </a:p>
-        </p:txBody>
-      </p:sp>
-    </p:spTree>
-  </p:cSld>
-  <p:clrMapOvr>
-    <a:masterClrMapping/>
-  </p:clrMapOvr>
-  <p:timing>
-    <p:tnLst>
-      <p:par>
-        <p:cTn id="1" dur="indefinite" restart="never" nodeType="tmRoot"/>
-      </p:par>
-    </p:tnLst>
-  </p:timing>
-</p:sld>
-</file>
-
-<file path=ppt/slides/slide13.xml><?xml version="1.0" encoding="utf-8"?>
-<p:sld xmlns:a="http://schemas.openxmlformats.org/drawingml/2006/main" xmlns:r="http://schemas.openxmlformats.org/officeDocument/2006/relationships" xmlns:p="http://schemas.openxmlformats.org/presentationml/2006/main">
-  <p:cSld>
-    <p:spTree>
-      <p:nvGrpSpPr>
-        <p:cNvPr id="1" name=""/>
-        <p:cNvGrpSpPr/>
-        <p:nvPr/>
-      </p:nvGrpSpPr>
-      <p:grpSpPr>
-        <a:xfrm>
-          <a:off x="0" y="0"/>
-          <a:ext cx="0" cy="0"/>
-          <a:chOff x="0" y="0"/>
-          <a:chExt cx="0" cy="0"/>
-        </a:xfrm>
-      </p:grpSpPr>
-      <p:sp>
-        <p:nvSpPr>
-          <p:cNvPr id="2" name="Title 1"/>
-          <p:cNvSpPr>
-            <a:spLocks noGrp="1"/>
-          </p:cNvSpPr>
-          <p:nvPr>
-            <p:ph type="title"/>
-          </p:nvPr>
-        </p:nvSpPr>
-        <p:spPr/>
-        <p:txBody>
-          <a:bodyPr/>
-          <a:lstStyle/>
-          <a:p>
-            <a:r>
-              <a:rPr lang="en-US" dirty="0" smtClean="0"/>
-              <a:t>Scrabble Helper</a:t>
-            </a:r>
-            <a:endParaRPr lang="en-US" dirty="0"/>
-          </a:p>
-        </p:txBody>
-      </p:sp>
-      <p:pic>
-        <p:nvPicPr>
-          <p:cNvPr id="2050" name="Picture 2"/>
-          <p:cNvPicPr>
-            <a:picLocks noGrp="1" noChangeAspect="1" noChangeArrowheads="1"/>
-          </p:cNvPicPr>
-          <p:nvPr>
-            <p:ph idx="1"/>
-          </p:nvPr>
-        </p:nvPicPr>
-        <p:blipFill>
-          <a:blip r:embed="rId2"/>
-          <a:srcRect/>
-          <a:stretch>
-            <a:fillRect/>
-          </a:stretch>
-        </p:blipFill>
-        <p:spPr bwMode="auto">
-          <a:xfrm>
-            <a:off x="1828800" y="2286000"/>
-            <a:ext cx="5606258" cy="4419600"/>
-          </a:xfrm>
-          <a:prstGeom prst="rect">
-            <a:avLst/>
-          </a:prstGeom>
-          <a:noFill/>
-          <a:ln w="9525">
-            <a:noFill/>
-            <a:miter lim="800000"/>
-            <a:headEnd/>
-            <a:tailEnd/>
-          </a:ln>
-          <a:effectLst/>
-        </p:spPr>
-      </p:pic>
-    </p:spTree>
-  </p:cSld>
-  <p:clrMapOvr>
-    <a:masterClrMapping/>
-  </p:clrMapOvr>
-  <p:timing>
-    <p:tnLst>
-      <p:par>
-        <p:cTn id="1" dur="indefinite" restart="never" nodeType="tmRoot"/>
-      </p:par>
-    </p:tnLst>
-  </p:timing>
-</p:sld>
-</file>
-
-<file path=ppt/slides/slide14.xml><?xml version="1.0" encoding="utf-8"?>
-<p:sld xmlns:a="http://schemas.openxmlformats.org/drawingml/2006/main" xmlns:r="http://schemas.openxmlformats.org/officeDocument/2006/relationships" xmlns:p="http://schemas.openxmlformats.org/presentationml/2006/main">
-  <p:cSld>
-    <p:spTree>
-      <p:nvGrpSpPr>
-        <p:cNvPr id="1" name=""/>
-        <p:cNvGrpSpPr/>
-        <p:nvPr/>
-      </p:nvGrpSpPr>
-      <p:grpSpPr>
-        <a:xfrm>
-          <a:off x="0" y="0"/>
-          <a:ext cx="0" cy="0"/>
-          <a:chOff x="0" y="0"/>
-          <a:chExt cx="0" cy="0"/>
-        </a:xfrm>
-      </p:grpSpPr>
-      <p:sp>
-        <p:nvSpPr>
-          <p:cNvPr id="2" name="Title 1"/>
-          <p:cNvSpPr>
-            <a:spLocks noGrp="1"/>
-          </p:cNvSpPr>
-          <p:nvPr>
-            <p:ph type="title"/>
-          </p:nvPr>
-        </p:nvSpPr>
-        <p:spPr/>
-        <p:txBody>
-          <a:bodyPr/>
-          <a:lstStyle/>
-          <a:p>
-            <a:r>
-              <a:rPr lang="en-US" dirty="0" smtClean="0"/>
-              <a:t>Redefined Zones:</a:t>
-            </a:r>
-            <a:endParaRPr lang="en-US" dirty="0"/>
-          </a:p>
-        </p:txBody>
-      </p:sp>
-      <p:pic>
-        <p:nvPicPr>
-          <p:cNvPr id="1026" name="Picture 2"/>
-          <p:cNvPicPr>
-            <a:picLocks noGrp="1" noChangeAspect="1" noChangeArrowheads="1"/>
-          </p:cNvPicPr>
-          <p:nvPr>
-            <p:ph idx="1"/>
-          </p:nvPr>
-        </p:nvPicPr>
-        <p:blipFill>
-          <a:blip r:embed="rId2"/>
-          <a:srcRect/>
-          <a:stretch>
-            <a:fillRect/>
-          </a:stretch>
-        </p:blipFill>
-        <p:spPr bwMode="auto">
-          <a:xfrm>
-            <a:off x="457200" y="2438400"/>
-            <a:ext cx="8072015" cy="3581400"/>
-          </a:xfrm>
-          <a:prstGeom prst="rect">
-            <a:avLst/>
-          </a:prstGeom>
-          <a:noFill/>
-          <a:ln w="9525">
-            <a:noFill/>
-            <a:miter lim="800000"/>
-            <a:headEnd/>
-            <a:tailEnd/>
-          </a:ln>
-          <a:effectLst/>
-        </p:spPr>
-      </p:pic>
-    </p:spTree>
-  </p:cSld>
-  <p:clrMapOvr>
-    <a:masterClrMapping/>
-  </p:clrMapOvr>
-  <p:timing>
-    <p:tnLst>
-      <p:par>
-        <p:cTn id="1" dur="indefinite" restart="never" nodeType="tmRoot"/>
-      </p:par>
-    </p:tnLst>
-  </p:timing>
-</p:sld>
-</file>
-
-<file path=ppt/slides/slide15.xml><?xml version="1.0" encoding="utf-8"?>
-<p:sld xmlns:a="http://schemas.openxmlformats.org/drawingml/2006/main" xmlns:r="http://schemas.openxmlformats.org/officeDocument/2006/relationships" xmlns:p="http://schemas.openxmlformats.org/presentationml/2006/main">
-  <p:cSld>
-    <p:spTree>
-      <p:nvGrpSpPr>
-        <p:cNvPr id="1" name=""/>
-        <p:cNvGrpSpPr/>
-        <p:nvPr/>
-      </p:nvGrpSpPr>
-      <p:grpSpPr>
-        <a:xfrm>
-          <a:off x="0" y="0"/>
-          <a:ext cx="0" cy="0"/>
-          <a:chOff x="0" y="0"/>
-          <a:chExt cx="0" cy="0"/>
-        </a:xfrm>
-      </p:grpSpPr>
-      <p:sp>
-        <p:nvSpPr>
-          <p:cNvPr id="2" name="Title 1"/>
-          <p:cNvSpPr>
-            <a:spLocks noGrp="1"/>
-          </p:cNvSpPr>
-          <p:nvPr>
-            <p:ph type="title"/>
-          </p:nvPr>
-        </p:nvSpPr>
-        <p:spPr/>
-        <p:txBody>
-          <a:bodyPr/>
-          <a:lstStyle/>
-          <a:p>
-            <a:r>
-              <a:rPr lang="en-US" dirty="0" smtClean="0"/>
-              <a:t>Redefined Zones:</a:t>
-            </a:r>
-            <a:endParaRPr lang="en-US" dirty="0"/>
-          </a:p>
-        </p:txBody>
-      </p:sp>
-      <p:pic>
-        <p:nvPicPr>
-          <p:cNvPr id="5" name="Content Placeholder 4" descr="ClassDiagram.jpg"/>
-          <p:cNvPicPr>
-            <a:picLocks noGrp="1" noChangeAspect="1"/>
-          </p:cNvPicPr>
-          <p:nvPr>
-            <p:ph idx="1"/>
-          </p:nvPr>
-        </p:nvPicPr>
-        <p:blipFill>
-          <a:blip r:embed="rId2"/>
-          <a:stretch>
-            <a:fillRect/>
-          </a:stretch>
-        </p:blipFill>
-        <p:spPr>
-          <a:xfrm>
-            <a:off x="1219200" y="2895600"/>
-            <a:ext cx="6667500" cy="1905000"/>
-          </a:xfrm>
-        </p:spPr>
-      </p:pic>
-    </p:spTree>
-  </p:cSld>
-  <p:clrMapOvr>
-    <a:masterClrMapping/>
-  </p:clrMapOvr>
-  <p:timing>
-    <p:tnLst>
-      <p:par>
-        <p:cTn id="1" dur="indefinite" restart="never" nodeType="tmRoot"/>
-      </p:par>
-    </p:tnLst>
-  </p:timing>
-</p:sld>
-</file>
-
-<file path=ppt/slides/slide16.xml><?xml version="1.0" encoding="utf-8"?>
-<p:sld xmlns:a="http://schemas.openxmlformats.org/drawingml/2006/main" xmlns:r="http://schemas.openxmlformats.org/officeDocument/2006/relationships" xmlns:p="http://schemas.openxmlformats.org/presentationml/2006/main">
-  <p:cSld>
-    <p:spTree>
-      <p:nvGrpSpPr>
-        <p:cNvPr id="1" name=""/>
-        <p:cNvGrpSpPr/>
-        <p:nvPr/>
-      </p:nvGrpSpPr>
-      <p:grpSpPr>
-        <a:xfrm>
-          <a:off x="0" y="0"/>
-          <a:ext cx="0" cy="0"/>
-          <a:chOff x="0" y="0"/>
-          <a:chExt cx="0" cy="0"/>
-        </a:xfrm>
-      </p:grpSpPr>
-      <p:sp>
-        <p:nvSpPr>
-          <p:cNvPr id="2" name="Title 1"/>
-          <p:cNvSpPr>
-            <a:spLocks noGrp="1"/>
-          </p:cNvSpPr>
-          <p:nvPr>
-            <p:ph type="title"/>
-          </p:nvPr>
-        </p:nvSpPr>
-        <p:spPr/>
-        <p:txBody>
-          <a:bodyPr/>
-          <a:lstStyle/>
-          <a:p>
-            <a:r>
-              <a:rPr lang="en-US" dirty="0" smtClean="0"/>
-              <a:t>Redefined Zones:</a:t>
-            </a:r>
-            <a:endParaRPr lang="en-US" dirty="0"/>
-          </a:p>
-        </p:txBody>
-      </p:sp>
-      <p:pic>
-        <p:nvPicPr>
-          <p:cNvPr id="5" name="Content Placeholder 4" descr="Updated UML-final.png"/>
-          <p:cNvPicPr>
-            <a:picLocks noGrp="1" noChangeAspect="1"/>
-          </p:cNvPicPr>
-          <p:nvPr>
-            <p:ph idx="1"/>
-          </p:nvPr>
-        </p:nvPicPr>
-        <p:blipFill>
-          <a:blip r:embed="rId2"/>
-          <a:stretch>
-            <a:fillRect/>
-          </a:stretch>
-        </p:blipFill>
-        <p:spPr>
-          <a:xfrm>
-            <a:off x="152400" y="2209800"/>
-            <a:ext cx="8872769" cy="4343400"/>
-          </a:xfrm>
-        </p:spPr>
-      </p:pic>
-    </p:spTree>
-  </p:cSld>
-  <p:clrMapOvr>
-    <a:masterClrMapping/>
-  </p:clrMapOvr>
-  <p:timing>
-    <p:tnLst>
-      <p:par>
-        <p:cTn id="1" dur="indefinite" restart="never" nodeType="tmRoot"/>
-      </p:par>
-    </p:tnLst>
-  </p:timing>
-</p:sld>
-</file>
-
-<file path=ppt/slides/slide17.xml><?xml version="1.0" encoding="utf-8"?>
-<p:sld xmlns:a="http://schemas.openxmlformats.org/drawingml/2006/main" xmlns:r="http://schemas.openxmlformats.org/officeDocument/2006/relationships" xmlns:p="http://schemas.openxmlformats.org/presentationml/2006/main">
-  <p:cSld>
-    <p:spTree>
-      <p:nvGrpSpPr>
-        <p:cNvPr id="1" name=""/>
-        <p:cNvGrpSpPr/>
-        <p:nvPr/>
-      </p:nvGrpSpPr>
-      <p:grpSpPr>
-        <a:xfrm>
-          <a:off x="0" y="0"/>
-          <a:ext cx="0" cy="0"/>
-          <a:chOff x="0" y="0"/>
-          <a:chExt cx="0" cy="0"/>
-        </a:xfrm>
-      </p:grpSpPr>
-      <p:sp>
-        <p:nvSpPr>
-          <p:cNvPr id="2" name="Title 1"/>
-          <p:cNvSpPr>
-            <a:spLocks noGrp="1"/>
-          </p:cNvSpPr>
-          <p:nvPr>
-            <p:ph type="title"/>
-          </p:nvPr>
-        </p:nvSpPr>
-        <p:spPr/>
-        <p:txBody>
-          <a:bodyPr/>
-          <a:lstStyle/>
-          <a:p>
-            <a:r>
-              <a:rPr lang="en-US" dirty="0" smtClean="0"/>
-              <a:t>Spell Checker and suggestion for words</a:t>
-            </a:r>
-            <a:endParaRPr lang="en-US" dirty="0"/>
-          </a:p>
-        </p:txBody>
-      </p:sp>
-      <p:pic>
-        <p:nvPicPr>
-          <p:cNvPr id="2050" name="Picture 2"/>
-          <p:cNvPicPr>
-            <a:picLocks noGrp="1" noChangeAspect="1" noChangeArrowheads="1"/>
-          </p:cNvPicPr>
-          <p:nvPr>
-            <p:ph idx="1"/>
-          </p:nvPr>
-        </p:nvPicPr>
-        <p:blipFill>
-          <a:blip r:embed="rId2"/>
-          <a:srcRect/>
-          <a:stretch>
-            <a:fillRect/>
-          </a:stretch>
-        </p:blipFill>
-        <p:spPr bwMode="auto">
-          <a:xfrm>
-            <a:off x="1752600" y="2286000"/>
-            <a:ext cx="5334000" cy="4218305"/>
-          </a:xfrm>
-          <a:prstGeom prst="rect">
-            <a:avLst/>
-          </a:prstGeom>
-          <a:noFill/>
-          <a:ln w="9525">
-            <a:noFill/>
-            <a:miter lim="800000"/>
-            <a:headEnd/>
-            <a:tailEnd/>
-          </a:ln>
-          <a:effectLst/>
-        </p:spPr>
-      </p:pic>
-    </p:spTree>
-  </p:cSld>
-  <p:clrMapOvr>
-    <a:masterClrMapping/>
-  </p:clrMapOvr>
-  <p:timing>
-    <p:tnLst>
-      <p:par>
-        <p:cTn id="1" dur="indefinite" restart="never" nodeType="tmRoot"/>
-      </p:par>
-    </p:tnLst>
-  </p:timing>
-</p:sld>
-</file>
-
-<file path=ppt/slides/slide18.xml><?xml version="1.0" encoding="utf-8"?>
-<p:sld xmlns:a="http://schemas.openxmlformats.org/drawingml/2006/main" xmlns:r="http://schemas.openxmlformats.org/officeDocument/2006/relationships" xmlns:p="http://schemas.openxmlformats.org/presentationml/2006/main">
-  <p:cSld>
-    <p:spTree>
-      <p:nvGrpSpPr>
-        <p:cNvPr id="1" name=""/>
-        <p:cNvGrpSpPr/>
-        <p:nvPr/>
-      </p:nvGrpSpPr>
-      <p:grpSpPr>
-        <a:xfrm>
-          <a:off x="0" y="0"/>
-          <a:ext cx="0" cy="0"/>
-          <a:chOff x="0" y="0"/>
-          <a:chExt cx="0" cy="0"/>
-        </a:xfrm>
-      </p:grpSpPr>
-      <p:sp>
-        <p:nvSpPr>
-          <p:cNvPr id="2" name="Title 1"/>
-          <p:cNvSpPr>
-            <a:spLocks noGrp="1"/>
-          </p:cNvSpPr>
-          <p:nvPr>
-            <p:ph type="title"/>
-          </p:nvPr>
-        </p:nvSpPr>
-        <p:spPr>
-          <a:xfrm>
-            <a:off x="1371600" y="3733800"/>
-            <a:ext cx="6571060" cy="706964"/>
-          </a:xfrm>
-          <a:ln>
-            <a:solidFill>
-              <a:schemeClr val="tx1"/>
-            </a:solidFill>
-          </a:ln>
-        </p:spPr>
-        <p:txBody>
-          <a:bodyPr/>
-          <a:lstStyle/>
-          <a:p>
-            <a:pPr algn="ctr"/>
-            <a:r>
-              <a:rPr lang="en-US" dirty="0" smtClean="0">
-                <a:solidFill>
-                  <a:schemeClr val="tx1"/>
-                </a:solidFill>
-              </a:rPr>
-              <a:t>THANK YOU</a:t>
-            </a:r>
-            <a:endParaRPr lang="en-US" dirty="0">
-              <a:solidFill>
-                <a:schemeClr val="tx1"/>
-              </a:solidFill>
-            </a:endParaRPr>
-          </a:p>
-        </p:txBody>
-      </p:sp>
-    </p:spTree>
-  </p:cSld>
-  <p:clrMapOvr>
-    <a:masterClrMapping/>
-  </p:clrMapOvr>
-  <p:timing>
-    <p:tnLst>
-      <p:par>
-        <p:cTn id="1" dur="indefinite" restart="never" nodeType="tmRoot"/>
-      </p:par>
-    </p:tnLst>
-  </p:timing>
-</p:sld>
-</file>
-
 <file path=ppt/slides/slide2.xml><?xml version="1.0" encoding="utf-8"?>
 <p:sld xmlns:a="http://schemas.openxmlformats.org/drawingml/2006/main" xmlns:r="http://schemas.openxmlformats.org/officeDocument/2006/relationships" xmlns:p="http://schemas.openxmlformats.org/presentationml/2006/main">
   <p:cSld>
@@ -14774,9 +13800,6 @@
           </a:bodyPr>
           <a:lstStyle/>
           <a:p>
-            <a:endParaRPr lang="en-US" dirty="0" smtClean="0"/>
-          </a:p>
-          <a:p>
             <a:r>
               <a:rPr lang="en-US" dirty="0" smtClean="0"/>
               <a:t>It is a place where user can execute multiple word related queries and by using the data generated by the user, </a:t>
@@ -14793,22 +13816,13 @@
           <a:p>
             <a:r>
               <a:rPr lang="en-US" dirty="0" smtClean="0"/>
-              <a:t>It is a place where one can Find, understand, know and Learn words</a:t>
+              <a:t>It is a place where one can Find, understand, know and Learn words.</a:t>
             </a:r>
+          </a:p>
+          <a:p>
             <a:r>
               <a:rPr lang="en-US" dirty="0" smtClean="0"/>
-              <a:t>.</a:t>
-            </a:r>
-            <a:endParaRPr lang="en-US" dirty="0" smtClean="0"/>
-          </a:p>
-          <a:p>
-            <a:r>
-              <a:rPr lang="en-US" dirty="0" smtClean="0"/>
-              <a:t>And hence it is a </a:t>
-            </a:r>
-            <a:r>
-              <a:rPr lang="en-US" dirty="0" smtClean="0"/>
-              <a:t>playground where users can explore and improve their vocabulary</a:t>
+              <a:t>And hence it is a playground where users can explore and improve their vocabulary</a:t>
             </a:r>
           </a:p>
           <a:p>
@@ -14890,15 +13904,7 @@
           <a:p>
             <a:r>
               <a:rPr lang="en-US" dirty="0" smtClean="0"/>
-              <a:t>It has </a:t>
-            </a:r>
-            <a:r>
-              <a:rPr lang="en-US" dirty="0" smtClean="0"/>
-              <a:t>Four parts</a:t>
-            </a:r>
-            <a:r>
-              <a:rPr lang="en-US" dirty="0" smtClean="0"/>
-              <a:t>:</a:t>
+              <a:t>It has Four parts:</a:t>
             </a:r>
           </a:p>
           <a:p>
@@ -14908,15 +13914,7 @@
             </a:pPr>
             <a:r>
               <a:rPr lang="en-US" dirty="0" smtClean="0"/>
-              <a:t>Find Zone </a:t>
-            </a:r>
-            <a:r>
-              <a:rPr lang="en-US" dirty="0" smtClean="0"/>
-              <a:t>- Where user can find words </a:t>
-            </a:r>
-            <a:r>
-              <a:rPr lang="en-US" dirty="0" smtClean="0"/>
-              <a:t>for crossword, scrabble and rhymes. </a:t>
+              <a:t>Find Zone - Where user can find words for crossword, scrabble and rhymes. </a:t>
             </a:r>
             <a:endParaRPr lang="en-US" sz="1200" dirty="0" smtClean="0"/>
           </a:p>
@@ -14927,11 +13925,7 @@
             </a:pPr>
             <a:r>
               <a:rPr lang="en-US" dirty="0" smtClean="0"/>
-              <a:t>Understand Zone </a:t>
-            </a:r>
-            <a:r>
-              <a:rPr lang="en-US" dirty="0" smtClean="0"/>
-              <a:t>– Where user can understand their word.</a:t>
+              <a:t>Understand Zone – Where user can understand their word.</a:t>
             </a:r>
             <a:endParaRPr lang="en-US" sz="1200" dirty="0" smtClean="0"/>
           </a:p>
@@ -14942,15 +13936,7 @@
             </a:pPr>
             <a:r>
               <a:rPr lang="en-US" dirty="0" smtClean="0"/>
-              <a:t>Knowledge Zone </a:t>
-            </a:r>
-            <a:r>
-              <a:rPr lang="en-US" dirty="0" smtClean="0"/>
-              <a:t>– Where user can know more words related to the entered </a:t>
-            </a:r>
-            <a:r>
-              <a:rPr lang="en-US" dirty="0" smtClean="0"/>
-              <a:t>word, like synonyms, antonyms etc.</a:t>
+              <a:t>Knowledge Zone – Where user can know more words related to the entered word, like synonyms, antonyms etc.</a:t>
             </a:r>
           </a:p>
           <a:p>
@@ -14962,7 +13948,6 @@
               <a:rPr lang="en-US" dirty="0" smtClean="0"/>
               <a:t>Learning Zone – Where user can learn new words on the basis of their vocabulary</a:t>
             </a:r>
-            <a:endParaRPr lang="en-US" dirty="0" smtClean="0"/>
           </a:p>
           <a:p>
             <a:endParaRPr lang="en-US" dirty="0"/>
@@ -15064,20 +14049,11 @@
               <a:rPr lang="en-US" dirty="0" smtClean="0"/>
               <a:t>KIVY </a:t>
             </a:r>
-            <a:endParaRPr lang="en-US" dirty="0" smtClean="0"/>
           </a:p>
           <a:p>
             <a:r>
               <a:rPr lang="en-US" dirty="0" smtClean="0"/>
-              <a:t>TOOLS </a:t>
-            </a:r>
-            <a:r>
-              <a:rPr lang="en-US" dirty="0" smtClean="0"/>
-              <a:t>AND </a:t>
-            </a:r>
-            <a:r>
-              <a:rPr lang="en-US" dirty="0" smtClean="0"/>
-              <a:t>LIBRARIES: </a:t>
+              <a:t>TOOLS AND LIBRARIES: </a:t>
             </a:r>
           </a:p>
           <a:p>
@@ -15093,7 +14069,6 @@
               <a:rPr lang="en-US" dirty="0" smtClean="0"/>
               <a:t>SPELL CHECKER</a:t>
             </a:r>
-            <a:endParaRPr lang="en-US" dirty="0" smtClean="0"/>
           </a:p>
           <a:p>
             <a:pPr lvl="1"/>
@@ -15106,15 +14081,7 @@
             <a:pPr lvl="1"/>
             <a:r>
               <a:rPr lang="en-US" dirty="0" smtClean="0"/>
-              <a:t>DATAMUSE </a:t>
-            </a:r>
-            <a:r>
-              <a:rPr lang="en-US" dirty="0" smtClean="0"/>
-              <a:t>AND OXFORD </a:t>
-            </a:r>
-            <a:r>
-              <a:rPr lang="en-US" dirty="0" smtClean="0"/>
-              <a:t>API</a:t>
+              <a:t>DATAMUSE AND OXFORD API</a:t>
             </a:r>
           </a:p>
           <a:p>
@@ -15128,32 +14095,20 @@
             <a:pPr lvl="1"/>
             <a:r>
               <a:rPr lang="en-US" dirty="0" smtClean="0"/>
-              <a:t>PICKLE</a:t>
+              <a:t>PICKLE	</a:t>
             </a:r>
+          </a:p>
+          <a:p>
             <a:r>
               <a:rPr lang="en-US" dirty="0" smtClean="0"/>
-              <a:t>	</a:t>
-            </a:r>
-          </a:p>
-          <a:p>
-            <a:r>
-              <a:rPr lang="en-US" dirty="0" smtClean="0"/>
-              <a:t>TRAINING </a:t>
-            </a:r>
-            <a:r>
-              <a:rPr lang="en-US" dirty="0" smtClean="0"/>
-              <a:t>MODEL	</a:t>
+              <a:t>TRAINING MODEL	</a:t>
             </a:r>
           </a:p>
           <a:p>
             <a:pPr lvl="1"/>
             <a:r>
               <a:rPr lang="en-US" dirty="0" smtClean="0"/>
-              <a:t>LSTM </a:t>
-            </a:r>
-            <a:r>
-              <a:rPr lang="en-US" dirty="0" smtClean="0"/>
-              <a:t>	</a:t>
+              <a:t>LSTM 	</a:t>
             </a:r>
           </a:p>
           <a:p>
@@ -15164,7 +14119,7 @@
     </p:spTree>
     <p:extLst>
       <p:ext uri="{BB962C8B-B14F-4D97-AF65-F5344CB8AC3E}">
-        <p14:creationId xmlns="" xmlns:p14="http://schemas.microsoft.com/office/powerpoint/2010/main" val="294594409"/>
+        <p14:creationId xmlns:p14="http://schemas.microsoft.com/office/powerpoint/2010/main" xmlns="" val="294594409"/>
       </p:ext>
     </p:extLst>
   </p:cSld>
@@ -15220,11 +14175,7 @@
           <a:p>
             <a:r>
               <a:rPr lang="en-US" dirty="0" smtClean="0"/>
-              <a:t>Modules and Detailed </a:t>
-            </a:r>
-            <a:r>
-              <a:rPr lang="en-US" dirty="0" smtClean="0"/>
-              <a:t>workflow</a:t>
+              <a:t>Modules and Detailed workflow</a:t>
             </a:r>
             <a:endParaRPr lang="en-US" dirty="0"/>
           </a:p>
@@ -15399,7 +14350,7 @@
           <a:p>
             <a:r>
               <a:rPr lang="en-US" dirty="0" smtClean="0"/>
-              <a:t>FINDZONE</a:t>
+              <a:t>Data Training</a:t>
             </a:r>
             <a:endParaRPr lang="en-US" dirty="0"/>
           </a:p>
@@ -15407,9 +14358,13 @@
       </p:sp>
       <p:pic>
         <p:nvPicPr>
-          <p:cNvPr id="6" name="Picture 5"/>
-          <p:cNvPicPr/>
-          <p:nvPr/>
+          <p:cNvPr id="1026" name="Picture 2"/>
+          <p:cNvPicPr>
+            <a:picLocks noGrp="1" noChangeAspect="1" noChangeArrowheads="1"/>
+          </p:cNvPicPr>
+          <p:nvPr>
+            <p:ph idx="1"/>
+          </p:nvPr>
         </p:nvPicPr>
         <p:blipFill>
           <a:blip r:embed="rId2"/>
@@ -15420,8 +14375,8 @@
         </p:blipFill>
         <p:spPr bwMode="auto">
           <a:xfrm>
-            <a:off x="1828800" y="2286000"/>
-            <a:ext cx="5486400" cy="4191000"/>
+            <a:off x="990600" y="2590800"/>
+            <a:ext cx="7360050" cy="3276600"/>
           </a:xfrm>
           <a:prstGeom prst="rect">
             <a:avLst/>
@@ -15433,6 +14388,7 @@
             <a:headEnd/>
             <a:tailEnd/>
           </a:ln>
+          <a:effectLst/>
         </p:spPr>
       </p:pic>
     </p:spTree>
@@ -15440,6 +14396,13 @@
   <p:clrMapOvr>
     <a:masterClrMapping/>
   </p:clrMapOvr>
+  <p:timing>
+    <p:tnLst>
+      <p:par>
+        <p:cTn id="1" dur="indefinite" restart="never" nodeType="tmRoot"/>
+      </p:par>
+    </p:tnLst>
+  </p:timing>
 </p:sld>
 </file>
 
@@ -15470,14 +14433,23 @@
             <p:ph type="title"/>
           </p:nvPr>
         </p:nvSpPr>
-        <p:spPr/>
+        <p:spPr>
+          <a:xfrm>
+            <a:off x="866216" y="973668"/>
+            <a:ext cx="7591984" cy="706964"/>
+          </a:xfrm>
+        </p:spPr>
         <p:txBody>
           <a:bodyPr/>
           <a:lstStyle/>
           <a:p>
             <a:r>
               <a:rPr lang="en-US" dirty="0" smtClean="0"/>
-              <a:t>Rhyming Dictionary </a:t>
+              <a:t>Demo Walkthrough of </a:t>
+            </a:r>
+            <a:r>
+              <a:rPr lang="en-US" dirty="0" err="1" smtClean="0"/>
+              <a:t>WordZone</a:t>
             </a:r>
             <a:endParaRPr lang="en-US" dirty="0"/>
           </a:p>
@@ -15485,62 +14457,31 @@
       </p:sp>
       <p:pic>
         <p:nvPicPr>
-          <p:cNvPr id="4" name="Picture 3"/>
-          <p:cNvPicPr/>
-          <p:nvPr/>
+          <p:cNvPr id="6" name="ppt 3.mp4">
+            <a:hlinkClick r:id="" action="ppaction://media"/>
+          </p:cNvPr>
+          <p:cNvPicPr>
+            <a:picLocks noGrp="1" noRot="1" noChangeAspect="1"/>
+          </p:cNvPicPr>
+          <p:nvPr>
+            <p:ph idx="1"/>
+            <a:videoFile r:link="rId1"/>
+          </p:nvPr>
         </p:nvPicPr>
         <p:blipFill>
-          <a:blip r:embed="rId3" cstate="print"/>
-          <a:srcRect/>
+          <a:blip r:embed="rId3"/>
           <a:stretch>
             <a:fillRect/>
           </a:stretch>
         </p:blipFill>
-        <p:spPr bwMode="auto">
+        <p:spPr>
           <a:xfrm>
-            <a:off x="533400" y="2590800"/>
-            <a:ext cx="4114800" cy="3429000"/>
+            <a:off x="1524000" y="2286000"/>
+            <a:ext cx="6096000" cy="4495800"/>
           </a:xfrm>
           <a:prstGeom prst="rect">
             <a:avLst/>
           </a:prstGeom>
-          <a:noFill/>
-          <a:ln w="9525">
-            <a:noFill/>
-            <a:miter lim="800000"/>
-            <a:headEnd/>
-            <a:tailEnd/>
-          </a:ln>
-        </p:spPr>
-      </p:pic>
-      <p:pic>
-        <p:nvPicPr>
-          <p:cNvPr id="5" name="Picture 4"/>
-          <p:cNvPicPr/>
-          <p:nvPr/>
-        </p:nvPicPr>
-        <p:blipFill>
-          <a:blip r:embed="rId4"/>
-          <a:srcRect b="19657"/>
-          <a:stretch>
-            <a:fillRect/>
-          </a:stretch>
-        </p:blipFill>
-        <p:spPr bwMode="auto">
-          <a:xfrm>
-            <a:off x="4724400" y="2590800"/>
-            <a:ext cx="4343400" cy="3429000"/>
-          </a:xfrm>
-          <a:prstGeom prst="rect">
-            <a:avLst/>
-          </a:prstGeom>
-          <a:noFill/>
-          <a:ln w="9525">
-            <a:noFill/>
-            <a:miter lim="800000"/>
-            <a:headEnd/>
-            <a:tailEnd/>
-          </a:ln>
         </p:spPr>
       </p:pic>
     </p:spTree>
@@ -15548,6 +14489,98 @@
   <p:clrMapOvr>
     <a:masterClrMapping/>
   </p:clrMapOvr>
+  <p:timing>
+    <p:tnLst>
+      <p:par>
+        <p:cTn id="1" dur="indefinite" restart="never" nodeType="tmRoot">
+          <p:childTnLst>
+            <p:seq concurrent="1" nextAc="seek">
+              <p:cTn id="2" restart="whenNotActive" fill="hold" evtFilter="cancelBubble" nodeType="interactiveSeq">
+                <p:stCondLst>
+                  <p:cond evt="onClick" delay="0">
+                    <p:tgtEl>
+                      <p:spTgt spid="6"/>
+                    </p:tgtEl>
+                  </p:cond>
+                </p:stCondLst>
+                <p:endSync evt="end" delay="0">
+                  <p:rtn val="all"/>
+                </p:endSync>
+                <p:childTnLst>
+                  <p:par>
+                    <p:cTn id="3" fill="hold">
+                      <p:stCondLst>
+                        <p:cond delay="0"/>
+                      </p:stCondLst>
+                      <p:childTnLst>
+                        <p:par>
+                          <p:cTn id="4" fill="hold">
+                            <p:stCondLst>
+                              <p:cond delay="0"/>
+                            </p:stCondLst>
+                            <p:childTnLst>
+                              <p:par>
+                                <p:cTn id="5" presetID="2" presetClass="mediacall" presetSubtype="0" fill="hold" nodeType="clickEffect">
+                                  <p:stCondLst>
+                                    <p:cond delay="0"/>
+                                  </p:stCondLst>
+                                  <p:childTnLst>
+                                    <p:cmd type="call" cmd="togglePause">
+                                      <p:cBhvr>
+                                        <p:cTn id="6" dur="1" fill="hold"/>
+                                        <p:tgtEl>
+                                          <p:spTgt spid="6"/>
+                                        </p:tgtEl>
+                                      </p:cBhvr>
+                                    </p:cmd>
+                                  </p:childTnLst>
+                                </p:cTn>
+                              </p:par>
+                            </p:childTnLst>
+                          </p:cTn>
+                        </p:par>
+                      </p:childTnLst>
+                    </p:cTn>
+                  </p:par>
+                </p:childTnLst>
+              </p:cTn>
+              <p:nextCondLst>
+                <p:cond evt="onClick" delay="0">
+                  <p:tgtEl>
+                    <p:spTgt spid="6"/>
+                  </p:tgtEl>
+                </p:cond>
+              </p:nextCondLst>
+            </p:seq>
+            <p:video>
+              <p:cMediaNode>
+                <p:cTn id="7" fill="hold" display="0">
+                  <p:stCondLst>
+                    <p:cond delay="indefinite"/>
+                  </p:stCondLst>
+                  <p:endCondLst>
+                    <p:cond evt="onNext" delay="0">
+                      <p:tgtEl>
+                        <p:sldTgt/>
+                      </p:tgtEl>
+                    </p:cond>
+                    <p:cond evt="onPrev" delay="0">
+                      <p:tgtEl>
+                        <p:sldTgt/>
+                      </p:tgtEl>
+                    </p:cond>
+                  </p:endCondLst>
+                </p:cTn>
+                <p:tgtEl>
+                  <p:spTgt spid="6"/>
+                </p:tgtEl>
+              </p:cMediaNode>
+            </p:video>
+          </p:childTnLst>
+        </p:cTn>
+      </p:par>
+    </p:tnLst>
+  </p:timing>
 </p:sld>
 </file>
 
@@ -15578,31 +14611,35 @@
             <p:ph type="title"/>
           </p:nvPr>
         </p:nvSpPr>
-        <p:spPr/>
+        <p:spPr>
+          <a:xfrm>
+            <a:off x="1371600" y="3733800"/>
+            <a:ext cx="6571060" cy="706964"/>
+          </a:xfrm>
+          <a:ln>
+            <a:solidFill>
+              <a:schemeClr val="tx1"/>
+            </a:solidFill>
+          </a:ln>
+        </p:spPr>
         <p:txBody>
           <a:bodyPr/>
           <a:lstStyle/>
           <a:p>
-            <a:endParaRPr lang="en-US"/>
-          </a:p>
-        </p:txBody>
-      </p:sp>
-      <p:sp>
-        <p:nvSpPr>
-          <p:cNvPr id="3" name="Content Placeholder 2"/>
-          <p:cNvSpPr>
-            <a:spLocks noGrp="1"/>
-          </p:cNvSpPr>
-          <p:nvPr>
-            <p:ph idx="1"/>
-          </p:nvPr>
-        </p:nvSpPr>
-        <p:spPr/>
-        <p:txBody>
-          <a:bodyPr/>
-          <a:lstStyle/>
-          <a:p>
-            <a:endParaRPr lang="en-US"/>
+            <a:pPr algn="ctr"/>
+            <a:r>
+              <a:rPr lang="en-US" dirty="0" smtClean="0">
+                <a:solidFill>
+                  <a:schemeClr val="tx1"/>
+                </a:solidFill>
+              </a:rPr>
+              <a:t>THANK YOU</a:t>
+            </a:r>
+            <a:endParaRPr lang="en-US" dirty="0">
+              <a:solidFill>
+                <a:schemeClr val="tx1"/>
+              </a:solidFill>
+            </a:endParaRPr>
           </a:p>
         </p:txBody>
       </p:sp>
@@ -15611,6 +14648,13 @@
   <p:clrMapOvr>
     <a:masterClrMapping/>
   </p:clrMapOvr>
+  <p:timing>
+    <p:tnLst>
+      <p:par>
+        <p:cTn id="1" dur="indefinite" restart="never" nodeType="tmRoot"/>
+      </p:par>
+    </p:tnLst>
+  </p:timing>
 </p:sld>
 </file>
 
@@ -15872,7 +14916,7 @@
   <a:extraClrSchemeLst/>
   <a:extLst>
     <a:ext uri="{05A4C25C-085E-4340-85A3-A5531E510DB2}">
-      <thm15:themeFamily xmlns="" xmlns:thm15="http://schemas.microsoft.com/office/thememl/2012/main" name="Ion Boardroom" id="{FC33163D-4339-46B1-8EED-24C834239D99}" vid="{B8502691-933B-45FE-8764-BA278511EF27}"/>
+      <thm15:themeFamily xmlns:thm15="http://schemas.microsoft.com/office/thememl/2012/main" xmlns="" name="Ion Boardroom" id="{FC33163D-4339-46B1-8EED-24C834239D99}" vid="{B8502691-933B-45FE-8764-BA278511EF27}"/>
     </a:ext>
   </a:extLst>
 </a:theme>

</xml_diff>